<commit_message>
Updated app.js and route/user.js
</commit_message>
<xml_diff>
--- a/Node/NodeProjectSteps.pptx
+++ b/Node/NodeProjectSteps.pptx
@@ -4010,7 +4010,7 @@
       </p:sp>
       <p:pic>
         <p:nvPicPr>
-          <p:cNvPr id="8194" name="Picture 2"/>
+          <p:cNvPr id="2050" name="Picture 2"/>
           <p:cNvPicPr>
             <a:picLocks noChangeAspect="1" noChangeArrowheads="1"/>
           </p:cNvPicPr>
@@ -4031,8 +4031,8 @@
         </p:blipFill>
         <p:spPr bwMode="auto">
           <a:xfrm>
-            <a:off x="381000" y="2362200"/>
-            <a:ext cx="8514413" cy="2137363"/>
+            <a:off x="685801" y="2309631"/>
+            <a:ext cx="7696200" cy="4345561"/>
           </a:xfrm>
           <a:prstGeom prst="rect">
             <a:avLst/>

</xml_diff>